<commit_message>
*) Updated presentation for aksad
</commit_message>
<xml_diff>
--- a/4th_sem/ak_SAD/grill_murrent/Ausgwählte Kapitel SAD.pptx
+++ b/4th_sem/ak_SAD/grill_murrent/Ausgwählte Kapitel SAD.pptx
@@ -9,7 +9,7 @@
     <p:sldId id="257" r:id="rId3"/>
     <p:sldId id="258" r:id="rId4"/>
     <p:sldId id="259" r:id="rId5"/>
-    <p:sldId id="260" r:id="rId6"/>
+    <p:sldId id="263" r:id="rId6"/>
     <p:sldId id="261" r:id="rId7"/>
     <p:sldId id="262" r:id="rId8"/>
   </p:sldIdLst>
@@ -4899,7 +4899,6 @@
               <a:rPr lang="de-AT" dirty="0"/>
               <a:t>, hochverfügbarer Aufbau</a:t>
             </a:r>
-            <a:endParaRPr lang="de-AT" dirty="0"/>
           </a:p>
         </p:txBody>
       </p:sp>
@@ -5051,7 +5050,9 @@
           </a:xfrm>
         </p:spPr>
         <p:txBody>
-          <a:bodyPr/>
+          <a:bodyPr>
+            <a:normAutofit lnSpcReduction="10000"/>
+          </a:bodyPr>
           <a:lstStyle/>
           <a:p>
             <a:r>
@@ -5092,7 +5093,7 @@
             </a:r>
             <a:r>
               <a:rPr lang="de-AT" dirty="0" err="1" smtClean="0"/>
-              <a:t>youBuy</a:t>
+              <a:t>uBuy</a:t>
             </a:r>
             <a:endParaRPr lang="de-AT" dirty="0" smtClean="0"/>
           </a:p>
@@ -5118,8 +5119,13 @@
             </a:r>
             <a:r>
               <a:rPr lang="de-AT" dirty="0" smtClean="0"/>
-              <a:t> = Gezielte personalisierte Angebote für    	Kunden</a:t>
-            </a:r>
+              <a:t> = Gezielte personalisierte Angebote für    </a:t>
+            </a:r>
+            <a:r>
+              <a:rPr lang="de-AT" dirty="0" smtClean="0"/>
+              <a:t>	Kunden</a:t>
+            </a:r>
+            <a:endParaRPr lang="de-AT" dirty="0" smtClean="0"/>
           </a:p>
           <a:p>
             <a:r>
@@ -5128,8 +5134,13 @@
             </a:r>
             <a:r>
               <a:rPr lang="de-AT" dirty="0" smtClean="0"/>
-              <a:t> =</a:t>
-            </a:r>
+              <a:t> </a:t>
+            </a:r>
+            <a:r>
+              <a:rPr lang="de-AT" dirty="0" smtClean="0"/>
+              <a:t>= Existierende Drittanbieter Apps</a:t>
+            </a:r>
+            <a:endParaRPr lang="de-AT" dirty="0" smtClean="0"/>
           </a:p>
           <a:p>
             <a:r>
@@ -5138,8 +5149,25 @@
             </a:r>
             <a:r>
               <a:rPr lang="de-AT" dirty="0" smtClean="0"/>
-              <a:t> =</a:t>
-            </a:r>
+              <a:t> </a:t>
+            </a:r>
+            <a:r>
+              <a:rPr lang="de-AT" dirty="0" smtClean="0"/>
+              <a:t>= Auf den Kunden zugeschnittene 			      Angebote</a:t>
+            </a:r>
+          </a:p>
+          <a:p>
+            <a:endParaRPr lang="de-AT" dirty="0"/>
+          </a:p>
+          <a:p>
+            <a:pPr marL="114300" indent="0" algn="ctr">
+              <a:buNone/>
+            </a:pPr>
+            <a:r>
+              <a:rPr lang="en-GB" sz="1800" i="1" dirty="0"/>
+              <a:t>To create a better every day life for the many people</a:t>
+            </a:r>
+            <a:endParaRPr lang="de-AT" sz="1800" i="1" dirty="0" smtClean="0"/>
           </a:p>
           <a:p>
             <a:endParaRPr lang="de-AT" dirty="0"/>
@@ -5191,12 +5219,7 @@
           <a:bodyPr/>
           <a:lstStyle/>
           <a:p>
-            <a:pPr algn="l"/>
-            <a:r>
-              <a:rPr lang="de-AT" dirty="0" smtClean="0"/>
-              <a:t>Features</a:t>
-            </a:r>
-            <a:endParaRPr lang="de-AT" dirty="0"/>
+            <a:endParaRPr lang="en-GB"/>
           </a:p>
         </p:txBody>
       </p:sp>
@@ -5215,14 +5238,815 @@
           <a:bodyPr/>
           <a:lstStyle/>
           <a:p>
-            <a:endParaRPr lang="de-AT" dirty="0"/>
+            <a:endParaRPr lang="en-GB" dirty="0"/>
+          </a:p>
+        </p:txBody>
+      </p:sp>
+      <p:pic>
+        <p:nvPicPr>
+          <p:cNvPr id="2050" name="Picture 2" descr="http://kunden-zufriedenheit-messen.de/images/img9.jpg"/>
+          <p:cNvPicPr>
+            <a:picLocks noChangeAspect="1" noChangeArrowheads="1"/>
+          </p:cNvPicPr>
+          <p:nvPr/>
+        </p:nvPicPr>
+        <p:blipFill>
+          <a:blip r:embed="rId2">
+            <a:extLst>
+              <a:ext uri="{28A0092B-C50C-407E-A947-70E740481C1C}">
+                <a14:useLocalDpi xmlns:a14="http://schemas.microsoft.com/office/drawing/2010/main" val="0"/>
+              </a:ext>
+            </a:extLst>
+          </a:blip>
+          <a:srcRect/>
+          <a:stretch>
+            <a:fillRect/>
+          </a:stretch>
+        </p:blipFill>
+        <p:spPr bwMode="auto">
+          <a:xfrm>
+            <a:off x="1088571" y="1752600"/>
+            <a:ext cx="6800665" cy="4728902"/>
+          </a:xfrm>
+          <a:prstGeom prst="rect">
+            <a:avLst/>
+          </a:prstGeom>
+          <a:noFill/>
+          <a:extLst>
+            <a:ext uri="{909E8E84-426E-40DD-AFC4-6F175D3DCCD1}">
+              <a14:hiddenFill xmlns:a14="http://schemas.microsoft.com/office/drawing/2010/main">
+                <a:solidFill>
+                  <a:srgbClr val="FFFFFF"/>
+                </a:solidFill>
+              </a14:hiddenFill>
+            </a:ext>
+          </a:extLst>
+        </p:spPr>
+      </p:pic>
+      <p:sp>
+        <p:nvSpPr>
+          <p:cNvPr id="5" name="Oval 4"/>
+          <p:cNvSpPr/>
+          <p:nvPr/>
+        </p:nvSpPr>
+        <p:spPr>
+          <a:xfrm flipH="1" flipV="1">
+            <a:off x="5029200" y="3651961"/>
+            <a:ext cx="114300" cy="114300"/>
+          </a:xfrm>
+          <a:prstGeom prst="ellipse">
+            <a:avLst/>
+          </a:prstGeom>
+          <a:solidFill>
+            <a:schemeClr val="tx1"/>
+          </a:solidFill>
+          <a:ln>
+            <a:noFill/>
+          </a:ln>
+        </p:spPr>
+        <p:style>
+          <a:lnRef idx="2">
+            <a:schemeClr val="accent1">
+              <a:shade val="50000"/>
+            </a:schemeClr>
+          </a:lnRef>
+          <a:fillRef idx="1">
+            <a:schemeClr val="accent1"/>
+          </a:fillRef>
+          <a:effectRef idx="0">
+            <a:schemeClr val="accent1"/>
+          </a:effectRef>
+          <a:fontRef idx="minor">
+            <a:schemeClr val="lt1"/>
+          </a:fontRef>
+        </p:style>
+        <p:txBody>
+          <a:bodyPr rtlCol="0" anchor="ctr"/>
+          <a:lstStyle/>
+          <a:p>
+            <a:pPr algn="ctr"/>
+            <a:endParaRPr lang="en-GB"/>
+          </a:p>
+        </p:txBody>
+      </p:sp>
+      <p:sp>
+        <p:nvSpPr>
+          <p:cNvPr id="6" name="TextBox 5"/>
+          <p:cNvSpPr txBox="1"/>
+          <p:nvPr/>
+        </p:nvSpPr>
+        <p:spPr>
+          <a:xfrm>
+            <a:off x="5600700" y="3179312"/>
+            <a:ext cx="1786066" cy="276999"/>
+          </a:xfrm>
+          <a:prstGeom prst="rect">
+            <a:avLst/>
+          </a:prstGeom>
+          <a:noFill/>
+        </p:spPr>
+        <p:txBody>
+          <a:bodyPr wrap="none" rtlCol="0">
+            <a:spAutoFit/>
+          </a:bodyPr>
+          <a:lstStyle/>
+          <a:p>
+            <a:r>
+              <a:rPr lang="de-AT" sz="1200" dirty="0" smtClean="0"/>
+              <a:t>Details zu Angeboten</a:t>
+            </a:r>
+            <a:endParaRPr lang="en-GB" sz="1200" dirty="0"/>
+          </a:p>
+        </p:txBody>
+      </p:sp>
+      <p:sp>
+        <p:nvSpPr>
+          <p:cNvPr id="7" name="Oval 6"/>
+          <p:cNvSpPr/>
+          <p:nvPr/>
+        </p:nvSpPr>
+        <p:spPr>
+          <a:xfrm flipH="1" flipV="1">
+            <a:off x="5486400" y="3260662"/>
+            <a:ext cx="114300" cy="114300"/>
+          </a:xfrm>
+          <a:prstGeom prst="ellipse">
+            <a:avLst/>
+          </a:prstGeom>
+          <a:solidFill>
+            <a:schemeClr val="tx1"/>
+          </a:solidFill>
+          <a:ln>
+            <a:noFill/>
+          </a:ln>
+        </p:spPr>
+        <p:style>
+          <a:lnRef idx="2">
+            <a:schemeClr val="accent1">
+              <a:shade val="50000"/>
+            </a:schemeClr>
+          </a:lnRef>
+          <a:fillRef idx="1">
+            <a:schemeClr val="accent1"/>
+          </a:fillRef>
+          <a:effectRef idx="0">
+            <a:schemeClr val="accent1"/>
+          </a:effectRef>
+          <a:fontRef idx="minor">
+            <a:schemeClr val="lt1"/>
+          </a:fontRef>
+        </p:style>
+        <p:txBody>
+          <a:bodyPr rtlCol="0" anchor="ctr"/>
+          <a:lstStyle/>
+          <a:p>
+            <a:pPr algn="ctr"/>
+            <a:endParaRPr lang="en-GB"/>
+          </a:p>
+        </p:txBody>
+      </p:sp>
+      <p:sp>
+        <p:nvSpPr>
+          <p:cNvPr id="8" name="TextBox 7"/>
+          <p:cNvSpPr txBox="1"/>
+          <p:nvPr/>
+        </p:nvSpPr>
+        <p:spPr>
+          <a:xfrm>
+            <a:off x="5143500" y="3573529"/>
+            <a:ext cx="2745736" cy="461665"/>
+          </a:xfrm>
+          <a:prstGeom prst="rect">
+            <a:avLst/>
+          </a:prstGeom>
+          <a:noFill/>
+        </p:spPr>
+        <p:txBody>
+          <a:bodyPr wrap="square" rtlCol="0">
+            <a:spAutoFit/>
+          </a:bodyPr>
+          <a:lstStyle/>
+          <a:p>
+            <a:r>
+              <a:rPr lang="de-AT" sz="1200" dirty="0" smtClean="0"/>
+              <a:t>Informationen zu Einkaufsmöglichkeiten</a:t>
+            </a:r>
+            <a:endParaRPr lang="en-GB" sz="1200" dirty="0"/>
+          </a:p>
+        </p:txBody>
+      </p:sp>
+      <p:sp>
+        <p:nvSpPr>
+          <p:cNvPr id="9" name="Oval 8"/>
+          <p:cNvSpPr/>
+          <p:nvPr/>
+        </p:nvSpPr>
+        <p:spPr>
+          <a:xfrm flipH="1" flipV="1">
+            <a:off x="2895600" y="5981700"/>
+            <a:ext cx="114300" cy="114300"/>
+          </a:xfrm>
+          <a:prstGeom prst="ellipse">
+            <a:avLst/>
+          </a:prstGeom>
+          <a:solidFill>
+            <a:schemeClr val="tx1"/>
+          </a:solidFill>
+          <a:ln>
+            <a:noFill/>
+          </a:ln>
+        </p:spPr>
+        <p:style>
+          <a:lnRef idx="2">
+            <a:schemeClr val="accent1">
+              <a:shade val="50000"/>
+            </a:schemeClr>
+          </a:lnRef>
+          <a:fillRef idx="1">
+            <a:schemeClr val="accent1"/>
+          </a:fillRef>
+          <a:effectRef idx="0">
+            <a:schemeClr val="accent1"/>
+          </a:effectRef>
+          <a:fontRef idx="minor">
+            <a:schemeClr val="lt1"/>
+          </a:fontRef>
+        </p:style>
+        <p:txBody>
+          <a:bodyPr rtlCol="0" anchor="ctr"/>
+          <a:lstStyle/>
+          <a:p>
+            <a:pPr algn="ctr"/>
+            <a:endParaRPr lang="en-GB"/>
+          </a:p>
+        </p:txBody>
+      </p:sp>
+      <p:sp>
+        <p:nvSpPr>
+          <p:cNvPr id="10" name="TextBox 9"/>
+          <p:cNvSpPr txBox="1"/>
+          <p:nvPr/>
+        </p:nvSpPr>
+        <p:spPr>
+          <a:xfrm>
+            <a:off x="3200399" y="5900350"/>
+            <a:ext cx="1199367" cy="276999"/>
+          </a:xfrm>
+          <a:prstGeom prst="rect">
+            <a:avLst/>
+          </a:prstGeom>
+          <a:noFill/>
+        </p:spPr>
+        <p:txBody>
+          <a:bodyPr wrap="none" rtlCol="0">
+            <a:spAutoFit/>
+          </a:bodyPr>
+          <a:lstStyle/>
+          <a:p>
+            <a:r>
+              <a:rPr lang="de-AT" sz="1200" dirty="0" smtClean="0"/>
+              <a:t>Verfügbarkeit</a:t>
+            </a:r>
+            <a:endParaRPr lang="en-GB" sz="1200" dirty="0"/>
+          </a:p>
+        </p:txBody>
+      </p:sp>
+      <p:sp>
+        <p:nvSpPr>
+          <p:cNvPr id="11" name="Oval 10"/>
+          <p:cNvSpPr/>
+          <p:nvPr/>
+        </p:nvSpPr>
+        <p:spPr>
+          <a:xfrm flipH="1" flipV="1">
+            <a:off x="3276600" y="5524500"/>
+            <a:ext cx="114300" cy="114300"/>
+          </a:xfrm>
+          <a:prstGeom prst="ellipse">
+            <a:avLst/>
+          </a:prstGeom>
+          <a:solidFill>
+            <a:schemeClr val="tx1"/>
+          </a:solidFill>
+          <a:ln>
+            <a:noFill/>
+          </a:ln>
+        </p:spPr>
+        <p:style>
+          <a:lnRef idx="2">
+            <a:schemeClr val="accent1">
+              <a:shade val="50000"/>
+            </a:schemeClr>
+          </a:lnRef>
+          <a:fillRef idx="1">
+            <a:schemeClr val="accent1"/>
+          </a:fillRef>
+          <a:effectRef idx="0">
+            <a:schemeClr val="accent1"/>
+          </a:effectRef>
+          <a:fontRef idx="minor">
+            <a:schemeClr val="lt1"/>
+          </a:fontRef>
+        </p:style>
+        <p:txBody>
+          <a:bodyPr rtlCol="0" anchor="ctr"/>
+          <a:lstStyle/>
+          <a:p>
+            <a:pPr algn="ctr"/>
+            <a:endParaRPr lang="en-GB"/>
+          </a:p>
+        </p:txBody>
+      </p:sp>
+      <p:sp>
+        <p:nvSpPr>
+          <p:cNvPr id="12" name="TextBox 11"/>
+          <p:cNvSpPr txBox="1"/>
+          <p:nvPr/>
+        </p:nvSpPr>
+        <p:spPr>
+          <a:xfrm>
+            <a:off x="3429000" y="5429249"/>
+            <a:ext cx="976549" cy="276999"/>
+          </a:xfrm>
+          <a:prstGeom prst="rect">
+            <a:avLst/>
+          </a:prstGeom>
+          <a:noFill/>
+        </p:spPr>
+        <p:txBody>
+          <a:bodyPr wrap="none" rtlCol="0">
+            <a:spAutoFit/>
+          </a:bodyPr>
+          <a:lstStyle/>
+          <a:p>
+            <a:r>
+              <a:rPr lang="de-AT" sz="1200" dirty="0" smtClean="0"/>
+              <a:t>Korrektheit</a:t>
+            </a:r>
+            <a:endParaRPr lang="en-GB" sz="1200" dirty="0"/>
+          </a:p>
+        </p:txBody>
+      </p:sp>
+      <p:sp>
+        <p:nvSpPr>
+          <p:cNvPr id="13" name="Oval 12"/>
+          <p:cNvSpPr/>
+          <p:nvPr/>
+        </p:nvSpPr>
+        <p:spPr>
+          <a:xfrm flipH="1" flipV="1">
+            <a:off x="3860124" y="4694464"/>
+            <a:ext cx="114300" cy="114300"/>
+          </a:xfrm>
+          <a:prstGeom prst="ellipse">
+            <a:avLst/>
+          </a:prstGeom>
+          <a:solidFill>
+            <a:schemeClr val="tx1"/>
+          </a:solidFill>
+          <a:ln>
+            <a:noFill/>
+          </a:ln>
+        </p:spPr>
+        <p:style>
+          <a:lnRef idx="2">
+            <a:schemeClr val="accent1">
+              <a:shade val="50000"/>
+            </a:schemeClr>
+          </a:lnRef>
+          <a:fillRef idx="1">
+            <a:schemeClr val="accent1"/>
+          </a:fillRef>
+          <a:effectRef idx="0">
+            <a:schemeClr val="accent1"/>
+          </a:effectRef>
+          <a:fontRef idx="minor">
+            <a:schemeClr val="lt1"/>
+          </a:fontRef>
+        </p:style>
+        <p:txBody>
+          <a:bodyPr rtlCol="0" anchor="ctr"/>
+          <a:lstStyle/>
+          <a:p>
+            <a:pPr algn="ctr"/>
+            <a:endParaRPr lang="en-GB"/>
+          </a:p>
+        </p:txBody>
+      </p:sp>
+      <p:sp>
+        <p:nvSpPr>
+          <p:cNvPr id="14" name="TextBox 13"/>
+          <p:cNvSpPr txBox="1"/>
+          <p:nvPr/>
+        </p:nvSpPr>
+        <p:spPr>
+          <a:xfrm>
+            <a:off x="2213047" y="4613114"/>
+            <a:ext cx="1593706" cy="276999"/>
+          </a:xfrm>
+          <a:prstGeom prst="rect">
+            <a:avLst/>
+          </a:prstGeom>
+          <a:noFill/>
+        </p:spPr>
+        <p:txBody>
+          <a:bodyPr wrap="none" rtlCol="0">
+            <a:spAutoFit/>
+          </a:bodyPr>
+          <a:lstStyle/>
+          <a:p>
+            <a:r>
+              <a:rPr lang="de-AT" sz="1200" dirty="0" smtClean="0"/>
+              <a:t>Aktuelle Angebote</a:t>
+            </a:r>
+            <a:endParaRPr lang="en-GB" sz="1200" dirty="0"/>
+          </a:p>
+        </p:txBody>
+      </p:sp>
+      <p:sp>
+        <p:nvSpPr>
+          <p:cNvPr id="15" name="Oval 14"/>
+          <p:cNvSpPr/>
+          <p:nvPr/>
+        </p:nvSpPr>
+        <p:spPr>
+          <a:xfrm flipH="1" flipV="1">
+            <a:off x="4521560" y="4993152"/>
+            <a:ext cx="114300" cy="114300"/>
+          </a:xfrm>
+          <a:prstGeom prst="ellipse">
+            <a:avLst/>
+          </a:prstGeom>
+          <a:solidFill>
+            <a:schemeClr val="tx1"/>
+          </a:solidFill>
+          <a:ln>
+            <a:noFill/>
+          </a:ln>
+        </p:spPr>
+        <p:style>
+          <a:lnRef idx="2">
+            <a:schemeClr val="accent1">
+              <a:shade val="50000"/>
+            </a:schemeClr>
+          </a:lnRef>
+          <a:fillRef idx="1">
+            <a:schemeClr val="accent1"/>
+          </a:fillRef>
+          <a:effectRef idx="0">
+            <a:schemeClr val="accent1"/>
+          </a:effectRef>
+          <a:fontRef idx="minor">
+            <a:schemeClr val="lt1"/>
+          </a:fontRef>
+        </p:style>
+        <p:txBody>
+          <a:bodyPr rtlCol="0" anchor="ctr"/>
+          <a:lstStyle/>
+          <a:p>
+            <a:pPr algn="ctr"/>
+            <a:endParaRPr lang="en-GB"/>
+          </a:p>
+        </p:txBody>
+      </p:sp>
+      <p:sp>
+        <p:nvSpPr>
+          <p:cNvPr id="16" name="TextBox 15"/>
+          <p:cNvSpPr txBox="1"/>
+          <p:nvPr/>
+        </p:nvSpPr>
+        <p:spPr>
+          <a:xfrm rot="3113547">
+            <a:off x="4439479" y="5225524"/>
+            <a:ext cx="827471" cy="276999"/>
+          </a:xfrm>
+          <a:prstGeom prst="rect">
+            <a:avLst/>
+          </a:prstGeom>
+          <a:noFill/>
+        </p:spPr>
+        <p:txBody>
+          <a:bodyPr wrap="none" rtlCol="0">
+            <a:spAutoFit/>
+          </a:bodyPr>
+          <a:lstStyle/>
+          <a:p>
+            <a:r>
+              <a:rPr lang="de-AT" sz="1200" dirty="0" smtClean="0"/>
+              <a:t>Stabilität</a:t>
+            </a:r>
+            <a:endParaRPr lang="en-GB" sz="1200" dirty="0"/>
+          </a:p>
+        </p:txBody>
+      </p:sp>
+      <p:sp>
+        <p:nvSpPr>
+          <p:cNvPr id="17" name="Oval 16"/>
+          <p:cNvSpPr/>
+          <p:nvPr/>
+        </p:nvSpPr>
+        <p:spPr>
+          <a:xfrm flipH="1" flipV="1">
+            <a:off x="5402583" y="4829277"/>
+            <a:ext cx="114300" cy="114300"/>
+          </a:xfrm>
+          <a:prstGeom prst="ellipse">
+            <a:avLst/>
+          </a:prstGeom>
+          <a:solidFill>
+            <a:schemeClr val="tx1"/>
+          </a:solidFill>
+          <a:ln>
+            <a:noFill/>
+          </a:ln>
+        </p:spPr>
+        <p:style>
+          <a:lnRef idx="2">
+            <a:schemeClr val="accent1">
+              <a:shade val="50000"/>
+            </a:schemeClr>
+          </a:lnRef>
+          <a:fillRef idx="1">
+            <a:schemeClr val="accent1"/>
+          </a:fillRef>
+          <a:effectRef idx="0">
+            <a:schemeClr val="accent1"/>
+          </a:effectRef>
+          <a:fontRef idx="minor">
+            <a:schemeClr val="lt1"/>
+          </a:fontRef>
+        </p:style>
+        <p:txBody>
+          <a:bodyPr rtlCol="0" anchor="ctr"/>
+          <a:lstStyle/>
+          <a:p>
+            <a:pPr algn="ctr"/>
+            <a:endParaRPr lang="en-GB"/>
+          </a:p>
+        </p:txBody>
+      </p:sp>
+      <p:sp>
+        <p:nvSpPr>
+          <p:cNvPr id="18" name="TextBox 17"/>
+          <p:cNvSpPr txBox="1"/>
+          <p:nvPr/>
+        </p:nvSpPr>
+        <p:spPr>
+          <a:xfrm rot="3113547">
+            <a:off x="5288104" y="5214988"/>
+            <a:ext cx="1167307" cy="276999"/>
+          </a:xfrm>
+          <a:prstGeom prst="rect">
+            <a:avLst/>
+          </a:prstGeom>
+          <a:noFill/>
+        </p:spPr>
+        <p:txBody>
+          <a:bodyPr wrap="none" rtlCol="0">
+            <a:spAutoFit/>
+          </a:bodyPr>
+          <a:lstStyle/>
+          <a:p>
+            <a:r>
+              <a:rPr lang="de-AT" sz="1200" dirty="0" smtClean="0"/>
+              <a:t>Skalierbarkeit</a:t>
+            </a:r>
+            <a:endParaRPr lang="en-GB" sz="1200" dirty="0"/>
+          </a:p>
+        </p:txBody>
+      </p:sp>
+      <p:sp>
+        <p:nvSpPr>
+          <p:cNvPr id="19" name="Oval 18"/>
+          <p:cNvSpPr/>
+          <p:nvPr/>
+        </p:nvSpPr>
+        <p:spPr>
+          <a:xfrm flipH="1" flipV="1">
+            <a:off x="6340933" y="4686300"/>
+            <a:ext cx="114300" cy="114300"/>
+          </a:xfrm>
+          <a:prstGeom prst="ellipse">
+            <a:avLst/>
+          </a:prstGeom>
+          <a:solidFill>
+            <a:schemeClr val="tx1"/>
+          </a:solidFill>
+          <a:ln>
+            <a:noFill/>
+          </a:ln>
+        </p:spPr>
+        <p:style>
+          <a:lnRef idx="2">
+            <a:schemeClr val="accent1">
+              <a:shade val="50000"/>
+            </a:schemeClr>
+          </a:lnRef>
+          <a:fillRef idx="1">
+            <a:schemeClr val="accent1"/>
+          </a:fillRef>
+          <a:effectRef idx="0">
+            <a:schemeClr val="accent1"/>
+          </a:effectRef>
+          <a:fontRef idx="minor">
+            <a:schemeClr val="lt1"/>
+          </a:fontRef>
+        </p:style>
+        <p:txBody>
+          <a:bodyPr rtlCol="0" anchor="ctr"/>
+          <a:lstStyle/>
+          <a:p>
+            <a:pPr algn="ctr"/>
+            <a:endParaRPr lang="en-GB"/>
+          </a:p>
+        </p:txBody>
+      </p:sp>
+      <p:sp>
+        <p:nvSpPr>
+          <p:cNvPr id="20" name="TextBox 19"/>
+          <p:cNvSpPr txBox="1"/>
+          <p:nvPr/>
+        </p:nvSpPr>
+        <p:spPr>
+          <a:xfrm rot="3113547">
+            <a:off x="6282396" y="5057115"/>
+            <a:ext cx="909223" cy="276999"/>
+          </a:xfrm>
+          <a:prstGeom prst="rect">
+            <a:avLst/>
+          </a:prstGeom>
+          <a:noFill/>
+        </p:spPr>
+        <p:txBody>
+          <a:bodyPr wrap="none" rtlCol="0">
+            <a:spAutoFit/>
+          </a:bodyPr>
+          <a:lstStyle/>
+          <a:p>
+            <a:r>
+              <a:rPr lang="de-AT" sz="1200" dirty="0" smtClean="0"/>
+              <a:t>Sicherheit</a:t>
+            </a:r>
+            <a:endParaRPr lang="en-GB" sz="1200" dirty="0"/>
+          </a:p>
+        </p:txBody>
+      </p:sp>
+      <p:sp>
+        <p:nvSpPr>
+          <p:cNvPr id="23" name="TextBox 22"/>
+          <p:cNvSpPr txBox="1"/>
+          <p:nvPr/>
+        </p:nvSpPr>
+        <p:spPr>
+          <a:xfrm>
+            <a:off x="4707141" y="2218844"/>
+            <a:ext cx="1830997" cy="461665"/>
+          </a:xfrm>
+          <a:prstGeom prst="rect">
+            <a:avLst/>
+          </a:prstGeom>
+          <a:noFill/>
+        </p:spPr>
+        <p:txBody>
+          <a:bodyPr wrap="square" rtlCol="0">
+            <a:spAutoFit/>
+          </a:bodyPr>
+          <a:lstStyle/>
+          <a:p>
+            <a:r>
+              <a:rPr lang="de-AT" sz="1200" dirty="0" smtClean="0"/>
+              <a:t>Angabe eines Benutzerprofils</a:t>
+            </a:r>
+            <a:endParaRPr lang="en-GB" sz="1200" dirty="0"/>
+          </a:p>
+        </p:txBody>
+      </p:sp>
+      <p:sp>
+        <p:nvSpPr>
+          <p:cNvPr id="24" name="Oval 23"/>
+          <p:cNvSpPr/>
+          <p:nvPr/>
+        </p:nvSpPr>
+        <p:spPr>
+          <a:xfrm flipH="1" flipV="1">
+            <a:off x="5917027" y="2519750"/>
+            <a:ext cx="114300" cy="114300"/>
+          </a:xfrm>
+          <a:prstGeom prst="ellipse">
+            <a:avLst/>
+          </a:prstGeom>
+          <a:solidFill>
+            <a:schemeClr val="tx1"/>
+          </a:solidFill>
+          <a:ln>
+            <a:noFill/>
+          </a:ln>
+        </p:spPr>
+        <p:style>
+          <a:lnRef idx="2">
+            <a:schemeClr val="accent1">
+              <a:shade val="50000"/>
+            </a:schemeClr>
+          </a:lnRef>
+          <a:fillRef idx="1">
+            <a:schemeClr val="accent1"/>
+          </a:fillRef>
+          <a:effectRef idx="0">
+            <a:schemeClr val="accent1"/>
+          </a:effectRef>
+          <a:fontRef idx="minor">
+            <a:schemeClr val="lt1"/>
+          </a:fontRef>
+        </p:style>
+        <p:txBody>
+          <a:bodyPr rtlCol="0" anchor="ctr"/>
+          <a:lstStyle/>
+          <a:p>
+            <a:pPr algn="ctr"/>
+            <a:endParaRPr lang="en-GB"/>
+          </a:p>
+        </p:txBody>
+      </p:sp>
+      <p:sp>
+        <p:nvSpPr>
+          <p:cNvPr id="25" name="Oval 24"/>
+          <p:cNvSpPr/>
+          <p:nvPr/>
+        </p:nvSpPr>
+        <p:spPr>
+          <a:xfrm flipH="1" flipV="1">
+            <a:off x="5410200" y="2933700"/>
+            <a:ext cx="114300" cy="114300"/>
+          </a:xfrm>
+          <a:prstGeom prst="ellipse">
+            <a:avLst/>
+          </a:prstGeom>
+          <a:solidFill>
+            <a:schemeClr val="tx1"/>
+          </a:solidFill>
+          <a:ln>
+            <a:noFill/>
+          </a:ln>
+        </p:spPr>
+        <p:style>
+          <a:lnRef idx="2">
+            <a:schemeClr val="accent1">
+              <a:shade val="50000"/>
+            </a:schemeClr>
+          </a:lnRef>
+          <a:fillRef idx="1">
+            <a:schemeClr val="accent1"/>
+          </a:fillRef>
+          <a:effectRef idx="0">
+            <a:schemeClr val="accent1"/>
+          </a:effectRef>
+          <a:fontRef idx="minor">
+            <a:schemeClr val="lt1"/>
+          </a:fontRef>
+        </p:style>
+        <p:txBody>
+          <a:bodyPr rtlCol="0" anchor="ctr"/>
+          <a:lstStyle/>
+          <a:p>
+            <a:pPr algn="ctr"/>
+            <a:endParaRPr lang="en-GB"/>
+          </a:p>
+        </p:txBody>
+      </p:sp>
+      <p:sp>
+        <p:nvSpPr>
+          <p:cNvPr id="26" name="TextBox 25"/>
+          <p:cNvSpPr txBox="1"/>
+          <p:nvPr/>
+        </p:nvSpPr>
+        <p:spPr>
+          <a:xfrm>
+            <a:off x="4053861" y="2852350"/>
+            <a:ext cx="1345453" cy="276999"/>
+          </a:xfrm>
+          <a:prstGeom prst="rect">
+            <a:avLst/>
+          </a:prstGeom>
+          <a:noFill/>
+        </p:spPr>
+        <p:txBody>
+          <a:bodyPr wrap="square" rtlCol="0">
+            <a:spAutoFit/>
+          </a:bodyPr>
+          <a:lstStyle/>
+          <a:p>
+            <a:r>
+              <a:rPr lang="de-AT" sz="1200" dirty="0" smtClean="0"/>
+              <a:t>Sprachauswahl</a:t>
+            </a:r>
+            <a:endParaRPr lang="en-GB" sz="1200" dirty="0"/>
           </a:p>
         </p:txBody>
       </p:sp>
     </p:spTree>
     <p:extLst>
       <p:ext uri="{BB962C8B-B14F-4D97-AF65-F5344CB8AC3E}">
-        <p14:creationId xmlns:p14="http://schemas.microsoft.com/office/powerpoint/2010/main" val="2224302673"/>
+        <p14:creationId xmlns:p14="http://schemas.microsoft.com/office/powerpoint/2010/main" val="3096138792"/>
       </p:ext>
     </p:extLst>
   </p:cSld>

</xml_diff>

<commit_message>
+) Update Presentation Grill und Murrent
</commit_message>
<xml_diff>
--- a/4th_sem/ak_SAD/grill_murrent/Ausgwählte Kapitel SAD.pptx
+++ b/4th_sem/ak_SAD/grill_murrent/Ausgwählte Kapitel SAD.pptx
@@ -5119,13 +5119,8 @@
             </a:r>
             <a:r>
               <a:rPr lang="de-AT" dirty="0" smtClean="0"/>
-              <a:t> = Gezielte personalisierte Angebote für    </a:t>
-            </a:r>
-            <a:r>
-              <a:rPr lang="de-AT" dirty="0" smtClean="0"/>
-              <a:t>	Kunden</a:t>
-            </a:r>
-            <a:endParaRPr lang="de-AT" dirty="0" smtClean="0"/>
+              <a:t> = Gezielte personalisierte Angebote für    	Kunden</a:t>
+            </a:r>
           </a:p>
           <a:p>
             <a:r>
@@ -5134,13 +5129,8 @@
             </a:r>
             <a:r>
               <a:rPr lang="de-AT" dirty="0" smtClean="0"/>
-              <a:t> </a:t>
-            </a:r>
-            <a:r>
-              <a:rPr lang="de-AT" dirty="0" smtClean="0"/>
-              <a:t>= Existierende Drittanbieter Apps</a:t>
-            </a:r>
-            <a:endParaRPr lang="de-AT" dirty="0" smtClean="0"/>
+              <a:t> = Existierende Drittanbieter Apps</a:t>
+            </a:r>
           </a:p>
           <a:p>
             <a:r>
@@ -5149,11 +5139,7 @@
             </a:r>
             <a:r>
               <a:rPr lang="de-AT" dirty="0" smtClean="0"/>
-              <a:t> </a:t>
-            </a:r>
-            <a:r>
-              <a:rPr lang="de-AT" dirty="0" smtClean="0"/>
-              <a:t>= Auf den Kunden zugeschnittene 			      Angebote</a:t>
+              <a:t> = Auf den Kunden zugeschnittene 			      Angebote</a:t>
             </a:r>
           </a:p>
           <a:p>
@@ -5204,47 +5190,9 @@
           <a:chExt cx="0" cy="0"/>
         </a:xfrm>
       </p:grpSpPr>
-      <p:sp>
-        <p:nvSpPr>
-          <p:cNvPr id="2" name="Title 1"/>
-          <p:cNvSpPr>
-            <a:spLocks noGrp="1"/>
-          </p:cNvSpPr>
-          <p:nvPr>
-            <p:ph type="title"/>
-          </p:nvPr>
-        </p:nvSpPr>
-        <p:spPr/>
-        <p:txBody>
-          <a:bodyPr/>
-          <a:lstStyle/>
-          <a:p>
-            <a:endParaRPr lang="en-GB"/>
-          </a:p>
-        </p:txBody>
-      </p:sp>
-      <p:sp>
-        <p:nvSpPr>
-          <p:cNvPr id="3" name="Content Placeholder 2"/>
-          <p:cNvSpPr>
-            <a:spLocks noGrp="1"/>
-          </p:cNvSpPr>
-          <p:nvPr>
-            <p:ph idx="1"/>
-          </p:nvPr>
-        </p:nvSpPr>
-        <p:spPr/>
-        <p:txBody>
-          <a:bodyPr/>
-          <a:lstStyle/>
-          <a:p>
-            <a:endParaRPr lang="en-GB" dirty="0"/>
-          </a:p>
-        </p:txBody>
-      </p:sp>
       <p:pic>
         <p:nvPicPr>
-          <p:cNvPr id="2050" name="Picture 2" descr="http://kunden-zufriedenheit-messen.de/images/img9.jpg"/>
+          <p:cNvPr id="1026" name="Picture 2"/>
           <p:cNvPicPr>
             <a:picLocks noChangeAspect="1" noChangeArrowheads="1"/>
           </p:cNvPicPr>
@@ -5265,24 +5213,61 @@
         </p:blipFill>
         <p:spPr bwMode="auto">
           <a:xfrm>
-            <a:off x="1088571" y="1752600"/>
-            <a:ext cx="6800665" cy="4728902"/>
+            <a:off x="1066800" y="1752600"/>
+            <a:ext cx="6800850" cy="4724400"/>
           </a:xfrm>
           <a:prstGeom prst="rect">
             <a:avLst/>
           </a:prstGeom>
           <a:noFill/>
+          <a:ln>
+            <a:noFill/>
+          </a:ln>
           <a:extLst>
             <a:ext uri="{909E8E84-426E-40DD-AFC4-6F175D3DCCD1}">
               <a14:hiddenFill xmlns:a14="http://schemas.microsoft.com/office/drawing/2010/main">
                 <a:solidFill>
-                  <a:srgbClr val="FFFFFF"/>
+                  <a:schemeClr val="accent1"/>
                 </a:solidFill>
               </a14:hiddenFill>
             </a:ext>
+            <a:ext uri="{91240B29-F687-4F45-9708-019B960494DF}">
+              <a14:hiddenLine xmlns:a14="http://schemas.microsoft.com/office/drawing/2010/main" w="9525">
+                <a:solidFill>
+                  <a:schemeClr val="tx1"/>
+                </a:solidFill>
+                <a:miter lim="800000"/>
+                <a:headEnd/>
+                <a:tailEnd/>
+              </a14:hiddenLine>
+            </a:ext>
           </a:extLst>
         </p:spPr>
       </p:pic>
+      <p:sp>
+        <p:nvSpPr>
+          <p:cNvPr id="2" name="Title 1"/>
+          <p:cNvSpPr>
+            <a:spLocks noGrp="1"/>
+          </p:cNvSpPr>
+          <p:nvPr>
+            <p:ph type="title"/>
+          </p:nvPr>
+        </p:nvSpPr>
+        <p:spPr/>
+        <p:txBody>
+          <a:bodyPr/>
+          <a:lstStyle/>
+          <a:p>
+            <a:pPr algn="l"/>
+            <a:r>
+              <a:rPr lang="en-GB" dirty="0" smtClean="0"/>
+              <a:t>Features</a:t>
+            </a:r>
+            <a:endParaRPr lang="en-GB" dirty="0"/>
+          </a:p>
+        </p:txBody>
+      </p:sp>
       <p:sp>
         <p:nvSpPr>
           <p:cNvPr id="5" name="Oval 4"/>
@@ -6109,10 +6094,28 @@
         </p:nvSpPr>
         <p:spPr/>
         <p:txBody>
-          <a:bodyPr/>
-          <a:lstStyle/>
-          <a:p>
-            <a:endParaRPr lang="de-AT"/>
+          <a:bodyPr>
+            <a:normAutofit/>
+          </a:bodyPr>
+          <a:lstStyle/>
+          <a:p>
+            <a:endParaRPr lang="de-AT" sz="4400" dirty="0" smtClean="0"/>
+          </a:p>
+          <a:p>
+            <a:r>
+              <a:rPr lang="de-AT" sz="4400" dirty="0" smtClean="0"/>
+              <a:t>1.000 Stunden</a:t>
+            </a:r>
+          </a:p>
+          <a:p>
+            <a:endParaRPr lang="de-AT" sz="4400" dirty="0" smtClean="0"/>
+          </a:p>
+          <a:p>
+            <a:r>
+              <a:rPr lang="de-AT" sz="4400" dirty="0" smtClean="0"/>
+              <a:t>2 50000€</a:t>
+            </a:r>
+            <a:endParaRPr lang="de-AT" sz="4400" dirty="0"/>
           </a:p>
         </p:txBody>
       </p:sp>
@@ -6185,7 +6188,23 @@
           <a:bodyPr/>
           <a:lstStyle/>
           <a:p>
+            <a:endParaRPr lang="de-AT" dirty="0" smtClean="0"/>
+          </a:p>
+          <a:p>
             <a:endParaRPr lang="de-AT" dirty="0"/>
+          </a:p>
+          <a:p>
+            <a:endParaRPr lang="de-AT" dirty="0" smtClean="0"/>
+          </a:p>
+          <a:p>
+            <a:endParaRPr lang="de-AT" dirty="0"/>
+          </a:p>
+          <a:p>
+            <a:r>
+              <a:rPr lang="de-AT" sz="3200" dirty="0" smtClean="0"/>
+              <a:t>4 Monate</a:t>
+            </a:r>
+            <a:endParaRPr lang="de-AT" dirty="0" smtClean="0"/>
           </a:p>
         </p:txBody>
       </p:sp>

</xml_diff>

<commit_message>
+) Update presentation (Grill Murrent)
</commit_message>
<xml_diff>
--- a/4th_sem/ak_SAD/grill_murrent/Ausgwählte Kapitel SAD.pptx
+++ b/4th_sem/ak_SAD/grill_murrent/Ausgwählte Kapitel SAD.pptx
@@ -6160,11 +6160,11 @@
           </a:p>
           <a:p>
             <a:r>
-              <a:rPr lang="de-AT" sz="4400" smtClean="0"/>
+              <a:rPr lang="de-AT" sz="4400" dirty="0" smtClean="0"/>
               <a:t>2 </a:t>
             </a:r>
             <a:r>
-              <a:rPr lang="de-AT" sz="4400" smtClean="0"/>
+              <a:rPr lang="de-AT" sz="4400" dirty="0" smtClean="0"/>
               <a:t>50000</a:t>
             </a:r>
             <a:r>
@@ -6270,6 +6270,14 @@
               <a:rPr lang="de-AT" sz="3200" dirty="0" smtClean="0"/>
               <a:t>4-5 Monate</a:t>
             </a:r>
+          </a:p>
+          <a:p>
+            <a:pPr lvl="1"/>
+            <a:r>
+              <a:rPr lang="de-AT" sz="2800" dirty="0" smtClean="0"/>
+              <a:t>Hardware Aufbau + Entwicklung</a:t>
+            </a:r>
+            <a:endParaRPr lang="de-AT" sz="2800" dirty="0" smtClean="0"/>
           </a:p>
           <a:p>
             <a:endParaRPr lang="de-AT" sz="3200" dirty="0" smtClean="0"/>

</xml_diff>

<commit_message>
*) Updated business strategy
</commit_message>
<xml_diff>
--- a/4th_sem/ak_SAD/grill_murrent/Ausgwählte Kapitel SAD.pptx
+++ b/4th_sem/ak_SAD/grill_murrent/Ausgwählte Kapitel SAD.pptx
@@ -110,6 +110,22 @@
       </a:defRPr>
     </a:lvl9pPr>
   </p:defaultTextStyle>
+  <p:extLst>
+    <p:ext uri="{EFAFB233-063F-42B5-8137-9DF3F51BA10A}">
+      <p15:sldGuideLst xmlns:p15="http://schemas.microsoft.com/office/powerpoint/2012/main">
+        <p15:guide id="1" orient="horz" pos="2160">
+          <p15:clr>
+            <a:srgbClr val="A4A3A4"/>
+          </p15:clr>
+        </p15:guide>
+        <p15:guide id="2" pos="2880">
+          <p15:clr>
+            <a:srgbClr val="A4A3A4"/>
+          </p15:clr>
+        </p15:guide>
+      </p15:sldGuideLst>
+    </p:ext>
+  </p:extLst>
 </p:presentation>
 </file>
 
@@ -4993,6 +5009,30 @@
           <a:bodyPr/>
           <a:lstStyle/>
           <a:p>
+            <a:r>
+              <a:rPr lang="de-AT" dirty="0" err="1" smtClean="0"/>
+              <a:t>uBuy</a:t>
+            </a:r>
+            <a:r>
+              <a:rPr lang="de-AT" dirty="0" smtClean="0"/>
+              <a:t> bietet den Kunden immer die besten personalisierten Angebote. </a:t>
+            </a:r>
+            <a:r>
+              <a:rPr lang="de-AT" dirty="0" err="1" smtClean="0"/>
+              <a:t>uBuy</a:t>
+            </a:r>
+            <a:r>
+              <a:rPr lang="de-AT" dirty="0" smtClean="0"/>
+              <a:t> gibt dem Benutzer </a:t>
+            </a:r>
+            <a:r>
+              <a:rPr lang="de-AT" smtClean="0"/>
+              <a:t>ein außergewöhnliches </a:t>
+            </a:r>
+            <a:r>
+              <a:rPr lang="de-AT" dirty="0" smtClean="0"/>
+              <a:t>Shopping Erlebnis.</a:t>
+            </a:r>
             <a:endParaRPr lang="de-AT" dirty="0"/>
           </a:p>
         </p:txBody>
@@ -5164,13 +5204,8 @@
             </a:r>
             <a:r>
               <a:rPr lang="de-AT" dirty="0" smtClean="0"/>
-              <a:t> = Auf den Kunden zugeschnittene 			      </a:t>
-            </a:r>
-            <a:r>
-              <a:rPr lang="de-AT" dirty="0" smtClean="0"/>
-              <a:t> Angebote</a:t>
-            </a:r>
-            <a:endParaRPr lang="de-AT" dirty="0" smtClean="0"/>
+              <a:t> = Auf den Kunden zugeschnittene 			       Angebote</a:t>
+            </a:r>
           </a:p>
           <a:p>
             <a:endParaRPr lang="de-AT" dirty="0"/>
@@ -6148,28 +6183,16 @@
           <a:p>
             <a:r>
               <a:rPr lang="de-AT" sz="4400" dirty="0" smtClean="0"/>
-              <a:t>1.850 </a:t>
-            </a:r>
+              <a:t>1.850 Stunden</a:t>
+            </a:r>
+          </a:p>
+          <a:p>
+            <a:endParaRPr lang="de-AT" sz="4400" dirty="0" smtClean="0"/>
+          </a:p>
+          <a:p>
             <a:r>
               <a:rPr lang="de-AT" sz="4400" dirty="0" smtClean="0"/>
-              <a:t>Stunden</a:t>
-            </a:r>
-          </a:p>
-          <a:p>
-            <a:endParaRPr lang="de-AT" sz="4400" dirty="0" smtClean="0"/>
-          </a:p>
-          <a:p>
-            <a:r>
-              <a:rPr lang="de-AT" sz="4400" dirty="0" smtClean="0"/>
-              <a:t>2 </a:t>
-            </a:r>
-            <a:r>
-              <a:rPr lang="de-AT" sz="4400" dirty="0" smtClean="0"/>
-              <a:t>50000</a:t>
-            </a:r>
-            <a:r>
-              <a:rPr lang="de-AT" sz="4400" dirty="0" smtClean="0"/>
-              <a:t>€</a:t>
+              <a:t>2 50000€</a:t>
             </a:r>
             <a:endParaRPr lang="de-AT" sz="4400" dirty="0"/>
           </a:p>

</xml_diff>

<commit_message>
*) Updated user controls
</commit_message>
<xml_diff>
--- a/4th_sem/ak_SAD/grill_murrent/Ausgwählte Kapitel SAD.pptx
+++ b/4th_sem/ak_SAD/grill_murrent/Ausgwählte Kapitel SAD.pptx
@@ -5015,23 +5015,17 @@
             </a:r>
             <a:r>
               <a:rPr lang="de-AT" dirty="0" smtClean="0"/>
-              <a:t> bietet den Kunden immer die besten personalisierten Angebote. </a:t>
-            </a:r>
+              <a:t> bietet den Kunden immer die besten personalisierten Angebote.</a:t>
+            </a:r>
+          </a:p>
+          <a:p>
             <a:r>
               <a:rPr lang="de-AT" dirty="0" err="1" smtClean="0"/>
               <a:t>uBuy</a:t>
             </a:r>
             <a:r>
               <a:rPr lang="de-AT" dirty="0" smtClean="0"/>
-              <a:t> gibt dem Benutzer </a:t>
-            </a:r>
-            <a:r>
-              <a:rPr lang="de-AT" smtClean="0"/>
-              <a:t>ein außergewöhnliches </a:t>
-            </a:r>
-            <a:r>
-              <a:rPr lang="de-AT" dirty="0" smtClean="0"/>
-              <a:t>Shopping Erlebnis.</a:t>
+              <a:t> gibt dem Benutzer ein außergewöhnliches Shopping Erlebnis.</a:t>
             </a:r>
             <a:endParaRPr lang="de-AT" dirty="0"/>
           </a:p>

</xml_diff>

<commit_message>
*) Update business strategy
</commit_message>
<xml_diff>
--- a/4th_sem/ak_SAD/grill_murrent/Ausgwählte Kapitel SAD.pptx
+++ b/4th_sem/ak_SAD/grill_murrent/Ausgwählte Kapitel SAD.pptx
@@ -5025,7 +5025,11 @@
             </a:r>
             <a:r>
               <a:rPr lang="de-AT" dirty="0" smtClean="0"/>
-              <a:t> gibt dem Benutzer ein außergewöhnliches Shopping Erlebnis.</a:t>
+              <a:t> gibt dem Benutzer ein außergewöhnliches Shopping Erlebnis unter Bereitstellung von detaillierten Produkt- </a:t>
+            </a:r>
+            <a:r>
+              <a:rPr lang="de-AT" smtClean="0"/>
+              <a:t>und Angebotsinformationen.</a:t>
             </a:r>
             <a:endParaRPr lang="de-AT" dirty="0"/>
           </a:p>

</xml_diff>

<commit_message>
*) Added models for ass project
</commit_message>
<xml_diff>
--- a/4th_sem/ak_SAD/grill_murrent/Ausgwählte Kapitel SAD.pptx
+++ b/4th_sem/ak_SAD/grill_murrent/Ausgwählte Kapitel SAD.pptx
@@ -5025,13 +5025,17 @@
             </a:r>
             <a:r>
               <a:rPr lang="de-AT" dirty="0" smtClean="0"/>
-              <a:t> gibt dem Benutzer ein außergewöhnliches Shopping Erlebnis unter Bereitstellung von detaillierten Produkt- </a:t>
-            </a:r>
-            <a:r>
-              <a:rPr lang="de-AT" smtClean="0"/>
-              <a:t>und Angebotsinformationen.</a:t>
-            </a:r>
-            <a:endParaRPr lang="de-AT" dirty="0"/>
+              <a:t> gibt den Kunden ein außergewöhnliches Shopping Erlebnis unter Bereitstellung von detaillierten Produkt- und Angebotsinformationen</a:t>
+            </a:r>
+          </a:p>
+          <a:p>
+            <a:pPr marL="114300" indent="0">
+              <a:buNone/>
+            </a:pPr>
+            <a:endParaRPr lang="de-AT" dirty="0" smtClean="0"/>
+          </a:p>
+          <a:p>
+            <a:endParaRPr lang="de-AT" dirty="0" smtClean="0"/>
           </a:p>
         </p:txBody>
       </p:sp>

</xml_diff>